<commit_message>
Documentation and code polish.
</commit_message>
<xml_diff>
--- a/Misc/sns.pptx
+++ b/Misc/sns.pptx
@@ -2,12 +2,12 @@
 <file path=ppt/presentation.xml><?xml version="1.0" encoding="utf-8"?>
 <p:presentation xmlns:a="http://schemas.openxmlformats.org/drawingml/2006/main" xmlns:r="http://schemas.openxmlformats.org/officeDocument/2006/relationships" xmlns:p="http://schemas.openxmlformats.org/presentationml/2006/main" saveSubsetFonts="1">
   <p:sldMasterIdLst>
-    <p:sldMasterId id="2147483660" r:id="rId1"/>
+    <p:sldMasterId id="2147483672" r:id="rId1"/>
   </p:sldMasterIdLst>
   <p:sldIdLst>
     <p:sldId id="257" r:id="rId2"/>
   </p:sldIdLst>
-  <p:sldSz cx="9144000" cy="6858000" type="screen4x3"/>
+  <p:sldSz cx="12801600" cy="6858000"/>
   <p:notesSz cx="6858000" cy="9144000"/>
   <p:defaultTextStyle>
     <a:defPPr>
@@ -141,8 +141,8 @@
         </p:nvSpPr>
         <p:spPr>
           <a:xfrm>
-            <a:off x="685800" y="1122363"/>
-            <a:ext cx="7772400" cy="2387600"/>
+            <a:off x="1600200" y="1122363"/>
+            <a:ext cx="9601200" cy="2387600"/>
           </a:xfrm>
         </p:spPr>
         <p:txBody>
@@ -173,8 +173,8 @@
         </p:nvSpPr>
         <p:spPr>
           <a:xfrm>
-            <a:off x="1143000" y="3602038"/>
-            <a:ext cx="6858000" cy="1655762"/>
+            <a:off x="1600200" y="3602038"/>
+            <a:ext cx="9601200" cy="1655762"/>
           </a:xfrm>
         </p:spPr>
         <p:txBody>
@@ -243,7 +243,7 @@
           <a:p>
             <a:fld id="{42E86A63-9A4E-4E30-9D36-AC950D70345E}" type="datetimeFigureOut">
               <a:rPr lang="en-US" smtClean="0"/>
-              <a:t>2/14/2023</a:t>
+              <a:t>3/20/2023</a:t>
             </a:fld>
             <a:endParaRPr lang="en-US"/>
           </a:p>
@@ -294,7 +294,7 @@
     </p:spTree>
     <p:extLst>
       <p:ext uri="{BB962C8B-B14F-4D97-AF65-F5344CB8AC3E}">
-        <p14:creationId xmlns:p14="http://schemas.microsoft.com/office/powerpoint/2010/main" val="3130774853"/>
+        <p14:creationId xmlns:p14="http://schemas.microsoft.com/office/powerpoint/2010/main" val="985324170"/>
       </p:ext>
     </p:extLst>
   </p:cSld>
@@ -413,7 +413,7 @@
           <a:p>
             <a:fld id="{42E86A63-9A4E-4E30-9D36-AC950D70345E}" type="datetimeFigureOut">
               <a:rPr lang="en-US" smtClean="0"/>
-              <a:t>2/14/2023</a:t>
+              <a:t>3/20/2023</a:t>
             </a:fld>
             <a:endParaRPr lang="en-US"/>
           </a:p>
@@ -464,7 +464,7 @@
     </p:spTree>
     <p:extLst>
       <p:ext uri="{BB962C8B-B14F-4D97-AF65-F5344CB8AC3E}">
-        <p14:creationId xmlns:p14="http://schemas.microsoft.com/office/powerpoint/2010/main" val="2622182142"/>
+        <p14:creationId xmlns:p14="http://schemas.microsoft.com/office/powerpoint/2010/main" val="2811986321"/>
       </p:ext>
     </p:extLst>
   </p:cSld>
@@ -503,8 +503,8 @@
         </p:nvSpPr>
         <p:spPr>
           <a:xfrm>
-            <a:off x="6543675" y="365125"/>
-            <a:ext cx="1971675" cy="5811838"/>
+            <a:off x="9161145" y="365125"/>
+            <a:ext cx="2760345" cy="5811838"/>
           </a:xfrm>
         </p:spPr>
         <p:txBody>
@@ -531,8 +531,8 @@
         </p:nvSpPr>
         <p:spPr>
           <a:xfrm>
-            <a:off x="628650" y="365125"/>
-            <a:ext cx="5800725" cy="5811838"/>
+            <a:off x="880110" y="365125"/>
+            <a:ext cx="8121015" cy="5811838"/>
           </a:xfrm>
         </p:spPr>
         <p:txBody>
@@ -593,7 +593,7 @@
           <a:p>
             <a:fld id="{42E86A63-9A4E-4E30-9D36-AC950D70345E}" type="datetimeFigureOut">
               <a:rPr lang="en-US" smtClean="0"/>
-              <a:t>2/14/2023</a:t>
+              <a:t>3/20/2023</a:t>
             </a:fld>
             <a:endParaRPr lang="en-US"/>
           </a:p>
@@ -644,7 +644,7 @@
     </p:spTree>
     <p:extLst>
       <p:ext uri="{BB962C8B-B14F-4D97-AF65-F5344CB8AC3E}">
-        <p14:creationId xmlns:p14="http://schemas.microsoft.com/office/powerpoint/2010/main" val="2914553718"/>
+        <p14:creationId xmlns:p14="http://schemas.microsoft.com/office/powerpoint/2010/main" val="83288711"/>
       </p:ext>
     </p:extLst>
   </p:cSld>
@@ -763,7 +763,7 @@
           <a:p>
             <a:fld id="{42E86A63-9A4E-4E30-9D36-AC950D70345E}" type="datetimeFigureOut">
               <a:rPr lang="en-US" smtClean="0"/>
-              <a:t>2/14/2023</a:t>
+              <a:t>3/20/2023</a:t>
             </a:fld>
             <a:endParaRPr lang="en-US"/>
           </a:p>
@@ -814,7 +814,7 @@
     </p:spTree>
     <p:extLst>
       <p:ext uri="{BB962C8B-B14F-4D97-AF65-F5344CB8AC3E}">
-        <p14:creationId xmlns:p14="http://schemas.microsoft.com/office/powerpoint/2010/main" val="2735597340"/>
+        <p14:creationId xmlns:p14="http://schemas.microsoft.com/office/powerpoint/2010/main" val="661069661"/>
       </p:ext>
     </p:extLst>
   </p:cSld>
@@ -853,8 +853,8 @@
         </p:nvSpPr>
         <p:spPr>
           <a:xfrm>
-            <a:off x="623888" y="1709739"/>
-            <a:ext cx="7886700" cy="2852737"/>
+            <a:off x="873443" y="1709739"/>
+            <a:ext cx="11041380" cy="2852737"/>
           </a:xfrm>
         </p:spPr>
         <p:txBody>
@@ -885,8 +885,8 @@
         </p:nvSpPr>
         <p:spPr>
           <a:xfrm>
-            <a:off x="623888" y="4589464"/>
-            <a:ext cx="7886700" cy="1500187"/>
+            <a:off x="873443" y="4589464"/>
+            <a:ext cx="11041380" cy="1500187"/>
           </a:xfrm>
         </p:spPr>
         <p:txBody>
@@ -896,7 +896,9 @@
               <a:buNone/>
               <a:defRPr sz="2400">
                 <a:solidFill>
-                  <a:schemeClr val="tx1"/>
+                  <a:schemeClr val="tx1">
+                    <a:tint val="75000"/>
+                  </a:schemeClr>
                 </a:solidFill>
               </a:defRPr>
             </a:lvl1pPr>
@@ -1007,7 +1009,7 @@
           <a:p>
             <a:fld id="{42E86A63-9A4E-4E30-9D36-AC950D70345E}" type="datetimeFigureOut">
               <a:rPr lang="en-US" smtClean="0"/>
-              <a:t>2/14/2023</a:t>
+              <a:t>3/20/2023</a:t>
             </a:fld>
             <a:endParaRPr lang="en-US"/>
           </a:p>
@@ -1058,7 +1060,7 @@
     </p:spTree>
     <p:extLst>
       <p:ext uri="{BB962C8B-B14F-4D97-AF65-F5344CB8AC3E}">
-        <p14:creationId xmlns:p14="http://schemas.microsoft.com/office/powerpoint/2010/main" val="2018238888"/>
+        <p14:creationId xmlns:p14="http://schemas.microsoft.com/office/powerpoint/2010/main" val="3401588603"/>
       </p:ext>
     </p:extLst>
   </p:cSld>
@@ -1120,8 +1122,8 @@
         </p:nvSpPr>
         <p:spPr>
           <a:xfrm>
-            <a:off x="628650" y="1825625"/>
-            <a:ext cx="3886200" cy="4351338"/>
+            <a:off x="880110" y="1825625"/>
+            <a:ext cx="5440680" cy="4351338"/>
           </a:xfrm>
         </p:spPr>
         <p:txBody>
@@ -1177,8 +1179,8 @@
         </p:nvSpPr>
         <p:spPr>
           <a:xfrm>
-            <a:off x="4629150" y="1825625"/>
-            <a:ext cx="3886200" cy="4351338"/>
+            <a:off x="6480810" y="1825625"/>
+            <a:ext cx="5440680" cy="4351338"/>
           </a:xfrm>
         </p:spPr>
         <p:txBody>
@@ -1239,7 +1241,7 @@
           <a:p>
             <a:fld id="{42E86A63-9A4E-4E30-9D36-AC950D70345E}" type="datetimeFigureOut">
               <a:rPr lang="en-US" smtClean="0"/>
-              <a:t>2/14/2023</a:t>
+              <a:t>3/20/2023</a:t>
             </a:fld>
             <a:endParaRPr lang="en-US"/>
           </a:p>
@@ -1290,7 +1292,7 @@
     </p:spTree>
     <p:extLst>
       <p:ext uri="{BB962C8B-B14F-4D97-AF65-F5344CB8AC3E}">
-        <p14:creationId xmlns:p14="http://schemas.microsoft.com/office/powerpoint/2010/main" val="902875861"/>
+        <p14:creationId xmlns:p14="http://schemas.microsoft.com/office/powerpoint/2010/main" val="695895704"/>
       </p:ext>
     </p:extLst>
   </p:cSld>
@@ -1329,8 +1331,8 @@
         </p:nvSpPr>
         <p:spPr>
           <a:xfrm>
-            <a:off x="629841" y="365126"/>
-            <a:ext cx="7886700" cy="1325563"/>
+            <a:off x="881777" y="365126"/>
+            <a:ext cx="11041380" cy="1325563"/>
           </a:xfrm>
         </p:spPr>
         <p:txBody>
@@ -1357,8 +1359,8 @@
         </p:nvSpPr>
         <p:spPr>
           <a:xfrm>
-            <a:off x="629842" y="1681163"/>
-            <a:ext cx="3868340" cy="823912"/>
+            <a:off x="881778" y="1681163"/>
+            <a:ext cx="5415676" cy="823912"/>
           </a:xfrm>
         </p:spPr>
         <p:txBody>
@@ -1422,8 +1424,8 @@
         </p:nvSpPr>
         <p:spPr>
           <a:xfrm>
-            <a:off x="629842" y="2505075"/>
-            <a:ext cx="3868340" cy="3684588"/>
+            <a:off x="881778" y="2505075"/>
+            <a:ext cx="5415676" cy="3684588"/>
           </a:xfrm>
         </p:spPr>
         <p:txBody>
@@ -1479,8 +1481,8 @@
         </p:nvSpPr>
         <p:spPr>
           <a:xfrm>
-            <a:off x="4629150" y="1681163"/>
-            <a:ext cx="3887391" cy="823912"/>
+            <a:off x="6480810" y="1681163"/>
+            <a:ext cx="5442347" cy="823912"/>
           </a:xfrm>
         </p:spPr>
         <p:txBody>
@@ -1544,8 +1546,8 @@
         </p:nvSpPr>
         <p:spPr>
           <a:xfrm>
-            <a:off x="4629150" y="2505075"/>
-            <a:ext cx="3887391" cy="3684588"/>
+            <a:off x="6480810" y="2505075"/>
+            <a:ext cx="5442347" cy="3684588"/>
           </a:xfrm>
         </p:spPr>
         <p:txBody>
@@ -1606,7 +1608,7 @@
           <a:p>
             <a:fld id="{42E86A63-9A4E-4E30-9D36-AC950D70345E}" type="datetimeFigureOut">
               <a:rPr lang="en-US" smtClean="0"/>
-              <a:t>2/14/2023</a:t>
+              <a:t>3/20/2023</a:t>
             </a:fld>
             <a:endParaRPr lang="en-US"/>
           </a:p>
@@ -1657,7 +1659,7 @@
     </p:spTree>
     <p:extLst>
       <p:ext uri="{BB962C8B-B14F-4D97-AF65-F5344CB8AC3E}">
-        <p14:creationId xmlns:p14="http://schemas.microsoft.com/office/powerpoint/2010/main" val="657333588"/>
+        <p14:creationId xmlns:p14="http://schemas.microsoft.com/office/powerpoint/2010/main" val="3917157628"/>
       </p:ext>
     </p:extLst>
   </p:cSld>
@@ -1724,7 +1726,7 @@
           <a:p>
             <a:fld id="{42E86A63-9A4E-4E30-9D36-AC950D70345E}" type="datetimeFigureOut">
               <a:rPr lang="en-US" smtClean="0"/>
-              <a:t>2/14/2023</a:t>
+              <a:t>3/20/2023</a:t>
             </a:fld>
             <a:endParaRPr lang="en-US"/>
           </a:p>
@@ -1775,7 +1777,7 @@
     </p:spTree>
     <p:extLst>
       <p:ext uri="{BB962C8B-B14F-4D97-AF65-F5344CB8AC3E}">
-        <p14:creationId xmlns:p14="http://schemas.microsoft.com/office/powerpoint/2010/main" val="1898172511"/>
+        <p14:creationId xmlns:p14="http://schemas.microsoft.com/office/powerpoint/2010/main" val="2546204079"/>
       </p:ext>
     </p:extLst>
   </p:cSld>
@@ -1819,7 +1821,7 @@
           <a:p>
             <a:fld id="{42E86A63-9A4E-4E30-9D36-AC950D70345E}" type="datetimeFigureOut">
               <a:rPr lang="en-US" smtClean="0"/>
-              <a:t>2/14/2023</a:t>
+              <a:t>3/20/2023</a:t>
             </a:fld>
             <a:endParaRPr lang="en-US"/>
           </a:p>
@@ -1870,7 +1872,7 @@
     </p:spTree>
     <p:extLst>
       <p:ext uri="{BB962C8B-B14F-4D97-AF65-F5344CB8AC3E}">
-        <p14:creationId xmlns:p14="http://schemas.microsoft.com/office/powerpoint/2010/main" val="3118070318"/>
+        <p14:creationId xmlns:p14="http://schemas.microsoft.com/office/powerpoint/2010/main" val="1243765682"/>
       </p:ext>
     </p:extLst>
   </p:cSld>
@@ -1909,8 +1911,8 @@
         </p:nvSpPr>
         <p:spPr>
           <a:xfrm>
-            <a:off x="629841" y="457200"/>
-            <a:ext cx="2949178" cy="1600200"/>
+            <a:off x="881778" y="457200"/>
+            <a:ext cx="4128849" cy="1600200"/>
           </a:xfrm>
         </p:spPr>
         <p:txBody>
@@ -1941,8 +1943,8 @@
         </p:nvSpPr>
         <p:spPr>
           <a:xfrm>
-            <a:off x="3887391" y="987426"/>
-            <a:ext cx="4629150" cy="4873625"/>
+            <a:off x="5442347" y="987426"/>
+            <a:ext cx="6480810" cy="4873625"/>
           </a:xfrm>
         </p:spPr>
         <p:txBody>
@@ -2026,8 +2028,8 @@
         </p:nvSpPr>
         <p:spPr>
           <a:xfrm>
-            <a:off x="629841" y="2057400"/>
-            <a:ext cx="2949178" cy="3811588"/>
+            <a:off x="881778" y="2057400"/>
+            <a:ext cx="4128849" cy="3811588"/>
           </a:xfrm>
         </p:spPr>
         <p:txBody>
@@ -2096,7 +2098,7 @@
           <a:p>
             <a:fld id="{42E86A63-9A4E-4E30-9D36-AC950D70345E}" type="datetimeFigureOut">
               <a:rPr lang="en-US" smtClean="0"/>
-              <a:t>2/14/2023</a:t>
+              <a:t>3/20/2023</a:t>
             </a:fld>
             <a:endParaRPr lang="en-US"/>
           </a:p>
@@ -2147,7 +2149,7 @@
     </p:spTree>
     <p:extLst>
       <p:ext uri="{BB962C8B-B14F-4D97-AF65-F5344CB8AC3E}">
-        <p14:creationId xmlns:p14="http://schemas.microsoft.com/office/powerpoint/2010/main" val="2826617124"/>
+        <p14:creationId xmlns:p14="http://schemas.microsoft.com/office/powerpoint/2010/main" val="3385381201"/>
       </p:ext>
     </p:extLst>
   </p:cSld>
@@ -2186,8 +2188,8 @@
         </p:nvSpPr>
         <p:spPr>
           <a:xfrm>
-            <a:off x="629841" y="457200"/>
-            <a:ext cx="2949178" cy="1600200"/>
+            <a:off x="881778" y="457200"/>
+            <a:ext cx="4128849" cy="1600200"/>
           </a:xfrm>
         </p:spPr>
         <p:txBody>
@@ -2218,8 +2220,8 @@
         </p:nvSpPr>
         <p:spPr>
           <a:xfrm>
-            <a:off x="3887391" y="987426"/>
-            <a:ext cx="4629150" cy="4873625"/>
+            <a:off x="5442347" y="987426"/>
+            <a:ext cx="6480810" cy="4873625"/>
           </a:xfrm>
         </p:spPr>
         <p:txBody>
@@ -2283,8 +2285,8 @@
         </p:nvSpPr>
         <p:spPr>
           <a:xfrm>
-            <a:off x="629841" y="2057400"/>
-            <a:ext cx="2949178" cy="3811588"/>
+            <a:off x="881778" y="2057400"/>
+            <a:ext cx="4128849" cy="3811588"/>
           </a:xfrm>
         </p:spPr>
         <p:txBody>
@@ -2353,7 +2355,7 @@
           <a:p>
             <a:fld id="{42E86A63-9A4E-4E30-9D36-AC950D70345E}" type="datetimeFigureOut">
               <a:rPr lang="en-US" smtClean="0"/>
-              <a:t>2/14/2023</a:t>
+              <a:t>3/20/2023</a:t>
             </a:fld>
             <a:endParaRPr lang="en-US"/>
           </a:p>
@@ -2404,7 +2406,7 @@
     </p:spTree>
     <p:extLst>
       <p:ext uri="{BB962C8B-B14F-4D97-AF65-F5344CB8AC3E}">
-        <p14:creationId xmlns:p14="http://schemas.microsoft.com/office/powerpoint/2010/main" val="1849203138"/>
+        <p14:creationId xmlns:p14="http://schemas.microsoft.com/office/powerpoint/2010/main" val="3336787777"/>
       </p:ext>
     </p:extLst>
   </p:cSld>
@@ -2448,8 +2450,8 @@
         </p:nvSpPr>
         <p:spPr>
           <a:xfrm>
-            <a:off x="628650" y="365126"/>
-            <a:ext cx="7886700" cy="1325563"/>
+            <a:off x="880110" y="365126"/>
+            <a:ext cx="11041380" cy="1325563"/>
           </a:xfrm>
           <a:prstGeom prst="rect">
             <a:avLst/>
@@ -2481,8 +2483,8 @@
         </p:nvSpPr>
         <p:spPr>
           <a:xfrm>
-            <a:off x="628650" y="1825625"/>
-            <a:ext cx="7886700" cy="4351338"/>
+            <a:off x="880110" y="1825625"/>
+            <a:ext cx="11041380" cy="4351338"/>
           </a:xfrm>
           <a:prstGeom prst="rect">
             <a:avLst/>
@@ -2543,8 +2545,8 @@
         </p:nvSpPr>
         <p:spPr>
           <a:xfrm>
-            <a:off x="628650" y="6356351"/>
-            <a:ext cx="2057400" cy="365125"/>
+            <a:off x="880110" y="6356351"/>
+            <a:ext cx="2880360" cy="365125"/>
           </a:xfrm>
           <a:prstGeom prst="rect">
             <a:avLst/>
@@ -2566,7 +2568,7 @@
           <a:p>
             <a:fld id="{42E86A63-9A4E-4E30-9D36-AC950D70345E}" type="datetimeFigureOut">
               <a:rPr lang="en-US" smtClean="0"/>
-              <a:t>2/14/2023</a:t>
+              <a:t>3/20/2023</a:t>
             </a:fld>
             <a:endParaRPr lang="en-US"/>
           </a:p>
@@ -2584,8 +2586,8 @@
         </p:nvSpPr>
         <p:spPr>
           <a:xfrm>
-            <a:off x="3028950" y="6356351"/>
-            <a:ext cx="3086100" cy="365125"/>
+            <a:off x="4240530" y="6356351"/>
+            <a:ext cx="4320540" cy="365125"/>
           </a:xfrm>
           <a:prstGeom prst="rect">
             <a:avLst/>
@@ -2621,8 +2623,8 @@
         </p:nvSpPr>
         <p:spPr>
           <a:xfrm>
-            <a:off x="6457950" y="6356351"/>
-            <a:ext cx="2057400" cy="365125"/>
+            <a:off x="9041130" y="6356351"/>
+            <a:ext cx="2880360" cy="365125"/>
           </a:xfrm>
           <a:prstGeom prst="rect">
             <a:avLst/>
@@ -2653,23 +2655,23 @@
     </p:spTree>
     <p:extLst>
       <p:ext uri="{BB962C8B-B14F-4D97-AF65-F5344CB8AC3E}">
-        <p14:creationId xmlns:p14="http://schemas.microsoft.com/office/powerpoint/2010/main" val="670516977"/>
+        <p14:creationId xmlns:p14="http://schemas.microsoft.com/office/powerpoint/2010/main" val="3228741438"/>
       </p:ext>
     </p:extLst>
   </p:cSld>
   <p:clrMap bg1="lt1" tx1="dk1" bg2="lt2" tx2="dk2" accent1="accent1" accent2="accent2" accent3="accent3" accent4="accent4" accent5="accent5" accent6="accent6" hlink="hlink" folHlink="folHlink"/>
   <p:sldLayoutIdLst>
-    <p:sldLayoutId id="2147483661" r:id="rId1"/>
-    <p:sldLayoutId id="2147483662" r:id="rId2"/>
-    <p:sldLayoutId id="2147483663" r:id="rId3"/>
-    <p:sldLayoutId id="2147483664" r:id="rId4"/>
-    <p:sldLayoutId id="2147483665" r:id="rId5"/>
-    <p:sldLayoutId id="2147483666" r:id="rId6"/>
-    <p:sldLayoutId id="2147483667" r:id="rId7"/>
-    <p:sldLayoutId id="2147483668" r:id="rId8"/>
-    <p:sldLayoutId id="2147483669" r:id="rId9"/>
-    <p:sldLayoutId id="2147483670" r:id="rId10"/>
-    <p:sldLayoutId id="2147483671" r:id="rId11"/>
+    <p:sldLayoutId id="2147483673" r:id="rId1"/>
+    <p:sldLayoutId id="2147483674" r:id="rId2"/>
+    <p:sldLayoutId id="2147483675" r:id="rId3"/>
+    <p:sldLayoutId id="2147483676" r:id="rId4"/>
+    <p:sldLayoutId id="2147483677" r:id="rId5"/>
+    <p:sldLayoutId id="2147483678" r:id="rId6"/>
+    <p:sldLayoutId id="2147483679" r:id="rId7"/>
+    <p:sldLayoutId id="2147483680" r:id="rId8"/>
+    <p:sldLayoutId id="2147483681" r:id="rId9"/>
+    <p:sldLayoutId id="2147483682" r:id="rId10"/>
+    <p:sldLayoutId id="2147483683" r:id="rId11"/>
   </p:sldLayoutIdLst>
   <p:txStyles>
     <p:titleStyle>
@@ -2982,15 +2984,15 @@
           </p:cNvPr>
           <p:cNvCxnSpPr>
             <a:cxnSpLocks/>
-            <a:stCxn id="8" idx="2"/>
+            <a:stCxn id="22" idx="2"/>
             <a:endCxn id="2" idx="0"/>
           </p:cNvCxnSpPr>
           <p:nvPr/>
         </p:nvCxnSpPr>
         <p:spPr>
           <a:xfrm>
-            <a:off x="2071925" y="1172305"/>
-            <a:ext cx="2" cy="4366849"/>
+            <a:off x="1821059" y="829582"/>
+            <a:ext cx="2" cy="5175742"/>
           </a:xfrm>
           <a:prstGeom prst="line">
             <a:avLst/>
@@ -3030,7 +3032,7 @@
         </p:nvSpPr>
         <p:spPr>
           <a:xfrm>
-            <a:off x="691662" y="5539154"/>
+            <a:off x="440796" y="6005325"/>
             <a:ext cx="2760530" cy="468923"/>
           </a:xfrm>
           <a:prstGeom prst="rect">
@@ -3067,7 +3069,7 @@
           <a:p>
             <a:pPr algn="ctr"/>
             <a:r>
-              <a:rPr lang="en-US" dirty="0" err="1">
+              <a:rPr lang="en-US" dirty="0">
                 <a:solidFill>
                   <a:schemeClr val="tx1"/>
                 </a:solidFill>
@@ -3075,12 +3077,6 @@
               </a:rPr>
               <a:t>CComparatorNetwork</a:t>
             </a:r>
-            <a:endParaRPr lang="en-US" dirty="0">
-              <a:solidFill>
-                <a:schemeClr val="tx1"/>
-              </a:solidFill>
-              <a:latin typeface="Consolas" panose="020B0609020204030204" pitchFamily="49" charset="0"/>
-            </a:endParaRPr>
           </a:p>
         </p:txBody>
       </p:sp>
@@ -3098,7 +3094,7 @@
         </p:nvSpPr>
         <p:spPr>
           <a:xfrm>
-            <a:off x="691661" y="4736123"/>
+            <a:off x="440796" y="5202294"/>
             <a:ext cx="2760531" cy="468923"/>
           </a:xfrm>
           <a:prstGeom prst="rect">
@@ -3135,7 +3131,7 @@
           <a:p>
             <a:pPr algn="ctr"/>
             <a:r>
-              <a:rPr lang="en-US" dirty="0" err="1">
+              <a:rPr lang="en-US" dirty="0">
                 <a:solidFill>
                   <a:schemeClr val="tx1"/>
                 </a:solidFill>
@@ -3143,12 +3139,6 @@
               </a:rPr>
               <a:t>CSortingNetwork</a:t>
             </a:r>
-            <a:endParaRPr lang="en-US" dirty="0">
-              <a:solidFill>
-                <a:schemeClr val="tx1"/>
-              </a:solidFill>
-              <a:latin typeface="Consolas" panose="020B0609020204030204" pitchFamily="49" charset="0"/>
-            </a:endParaRPr>
           </a:p>
         </p:txBody>
       </p:sp>
@@ -3166,7 +3156,7 @@
         </p:nvSpPr>
         <p:spPr>
           <a:xfrm>
-            <a:off x="691661" y="3933092"/>
+            <a:off x="440796" y="4399263"/>
             <a:ext cx="2760531" cy="468923"/>
           </a:xfrm>
           <a:prstGeom prst="rect">
@@ -3228,7 +3218,7 @@
         </p:nvSpPr>
         <p:spPr>
           <a:xfrm>
-            <a:off x="691661" y="3130061"/>
+            <a:off x="440796" y="3596232"/>
             <a:ext cx="2760531" cy="468923"/>
           </a:xfrm>
           <a:prstGeom prst="rect">
@@ -3265,7 +3255,7 @@
           <a:p>
             <a:pPr algn="ctr"/>
             <a:r>
-              <a:rPr lang="en-US" dirty="0" err="1">
+              <a:rPr lang="en-US" dirty="0">
                 <a:solidFill>
                   <a:schemeClr val="tx1"/>
                 </a:solidFill>
@@ -3273,12 +3263,6 @@
               </a:rPr>
               <a:t>CSearchable</a:t>
             </a:r>
-            <a:endParaRPr lang="en-US" dirty="0">
-              <a:solidFill>
-                <a:schemeClr val="tx1"/>
-              </a:solidFill>
-              <a:latin typeface="Consolas" panose="020B0609020204030204" pitchFamily="49" charset="0"/>
-            </a:endParaRPr>
           </a:p>
         </p:txBody>
       </p:sp>
@@ -3296,7 +3280,7 @@
         </p:nvSpPr>
         <p:spPr>
           <a:xfrm>
-            <a:off x="691661" y="2321168"/>
+            <a:off x="440795" y="2787339"/>
             <a:ext cx="2760530" cy="468923"/>
           </a:xfrm>
           <a:prstGeom prst="rect">
@@ -3358,7 +3342,7 @@
         </p:nvSpPr>
         <p:spPr>
           <a:xfrm>
-            <a:off x="691660" y="1512275"/>
+            <a:off x="440795" y="1978446"/>
             <a:ext cx="2760531" cy="468923"/>
           </a:xfrm>
           <a:prstGeom prst="rect">
@@ -3395,7 +3379,7 @@
           <a:p>
             <a:pPr algn="ctr"/>
             <a:r>
-              <a:rPr lang="en-US" dirty="0" err="1">
+              <a:rPr lang="en-US" dirty="0">
                 <a:solidFill>
                   <a:schemeClr val="tx1"/>
                 </a:solidFill>
@@ -3403,12 +3387,6 @@
               </a:rPr>
               <a:t>CAutocomplete</a:t>
             </a:r>
-            <a:endParaRPr lang="en-US" dirty="0">
-              <a:solidFill>
-                <a:schemeClr val="tx1"/>
-              </a:solidFill>
-              <a:latin typeface="Consolas" panose="020B0609020204030204" pitchFamily="49" charset="0"/>
-            </a:endParaRPr>
           </a:p>
         </p:txBody>
       </p:sp>
@@ -3426,7 +3404,7 @@
         </p:nvSpPr>
         <p:spPr>
           <a:xfrm>
-            <a:off x="691660" y="703382"/>
+            <a:off x="440794" y="1169553"/>
             <a:ext cx="2760530" cy="468923"/>
           </a:xfrm>
           <a:prstGeom prst="rect">
@@ -3463,7 +3441,7 @@
           <a:p>
             <a:pPr algn="ctr"/>
             <a:r>
-              <a:rPr lang="en-US" dirty="0" err="1">
+              <a:rPr lang="en-US" dirty="0">
                 <a:solidFill>
                   <a:schemeClr val="tx1"/>
                 </a:solidFill>
@@ -3471,12 +3449,6 @@
               </a:rPr>
               <a:t>CNearsort</a:t>
             </a:r>
-            <a:endParaRPr lang="en-US" dirty="0">
-              <a:solidFill>
-                <a:schemeClr val="tx1"/>
-              </a:solidFill>
-              <a:latin typeface="Consolas" panose="020B0609020204030204" pitchFamily="49" charset="0"/>
-            </a:endParaRPr>
           </a:p>
         </p:txBody>
       </p:sp>
@@ -3494,7 +3466,7 @@
         </p:nvSpPr>
         <p:spPr>
           <a:xfrm>
-            <a:off x="3637678" y="5539154"/>
+            <a:off x="3386813" y="6005325"/>
             <a:ext cx="5084249" cy="468923"/>
           </a:xfrm>
           <a:prstGeom prst="rect">
@@ -3552,8 +3524,8 @@
         </p:nvSpPr>
         <p:spPr>
           <a:xfrm>
-            <a:off x="3637679" y="4736122"/>
-            <a:ext cx="5084249" cy="468923"/>
+            <a:off x="3386814" y="5202293"/>
+            <a:ext cx="7593680" cy="468923"/>
           </a:xfrm>
           <a:prstGeom prst="rect">
             <a:avLst/>
@@ -3610,8 +3582,8 @@
         </p:nvSpPr>
         <p:spPr>
           <a:xfrm>
-            <a:off x="3637704" y="3933091"/>
-            <a:ext cx="5295281" cy="468923"/>
+            <a:off x="3386839" y="4399262"/>
+            <a:ext cx="8101450" cy="468923"/>
           </a:xfrm>
           <a:prstGeom prst="rect">
             <a:avLst/>
@@ -3668,8 +3640,8 @@
         </p:nvSpPr>
         <p:spPr>
           <a:xfrm>
-            <a:off x="3637704" y="3130060"/>
-            <a:ext cx="5295267" cy="468923"/>
+            <a:off x="3386839" y="3596231"/>
+            <a:ext cx="7593692" cy="468923"/>
           </a:xfrm>
           <a:prstGeom prst="rect">
             <a:avLst/>
@@ -3726,8 +3698,8 @@
         </p:nvSpPr>
         <p:spPr>
           <a:xfrm>
-            <a:off x="3637704" y="2318236"/>
-            <a:ext cx="5084249" cy="468923"/>
+            <a:off x="3386839" y="2784407"/>
+            <a:ext cx="8101446" cy="468923"/>
           </a:xfrm>
           <a:prstGeom prst="rect">
             <a:avLst/>
@@ -3784,7 +3756,7 @@
         </p:nvSpPr>
         <p:spPr>
           <a:xfrm>
-            <a:off x="3637704" y="1506411"/>
+            <a:off x="3386839" y="1972582"/>
             <a:ext cx="5084243" cy="468923"/>
           </a:xfrm>
           <a:prstGeom prst="rect">
@@ -3842,7 +3814,7 @@
         </p:nvSpPr>
         <p:spPr>
           <a:xfrm>
-            <a:off x="3637722" y="703381"/>
+            <a:off x="3386856" y="1169552"/>
             <a:ext cx="5380382" cy="468923"/>
           </a:xfrm>
           <a:prstGeom prst="rect">
@@ -3882,6 +3854,128 @@
                 </a:solidFill>
               </a:rPr>
               <a:t>Use reachability heuristic to prune at second-last layer.</a:t>
+            </a:r>
+          </a:p>
+        </p:txBody>
+      </p:sp>
+      <p:sp>
+        <p:nvSpPr>
+          <p:cNvPr id="22" name="Rectangle 21">
+            <a:extLst>
+              <a:ext uri="{FF2B5EF4-FFF2-40B4-BE49-F238E27FC236}">
+                <a16:creationId xmlns:a16="http://schemas.microsoft.com/office/drawing/2014/main" id="{1C80B295-8DB4-4846-A367-0F88C0F0C11D}"/>
+              </a:ext>
+            </a:extLst>
+          </p:cNvPr>
+          <p:cNvSpPr/>
+          <p:nvPr/>
+        </p:nvSpPr>
+        <p:spPr>
+          <a:xfrm>
+            <a:off x="440794" y="360660"/>
+            <a:ext cx="2760530" cy="468923"/>
+          </a:xfrm>
+          <a:prstGeom prst="rect">
+            <a:avLst/>
+          </a:prstGeom>
+          <a:solidFill>
+            <a:schemeClr val="bg1">
+              <a:lumMod val="85000"/>
+            </a:schemeClr>
+          </a:solidFill>
+          <a:ln w="15875">
+            <a:solidFill>
+              <a:schemeClr val="tx1"/>
+            </a:solidFill>
+          </a:ln>
+        </p:spPr>
+        <p:style>
+          <a:lnRef idx="2">
+            <a:schemeClr val="accent1">
+              <a:shade val="50000"/>
+            </a:schemeClr>
+          </a:lnRef>
+          <a:fillRef idx="1">
+            <a:schemeClr val="accent1"/>
+          </a:fillRef>
+          <a:effectRef idx="0">
+            <a:schemeClr val="accent1"/>
+          </a:effectRef>
+          <a:fontRef idx="minor">
+            <a:schemeClr val="lt1"/>
+          </a:fontRef>
+        </p:style>
+        <p:txBody>
+          <a:bodyPr rtlCol="0" anchor="ctr"/>
+          <a:lstStyle/>
+          <a:p>
+            <a:pPr algn="ctr"/>
+            <a:r>
+              <a:rPr lang="en-US" dirty="0">
+                <a:solidFill>
+                  <a:schemeClr val="tx1"/>
+                </a:solidFill>
+                <a:latin typeface="Consolas" panose="020B0609020204030204" pitchFamily="49" charset="0"/>
+              </a:rPr>
+              <a:t>CNearsort2</a:t>
+            </a:r>
+          </a:p>
+        </p:txBody>
+      </p:sp>
+      <p:sp>
+        <p:nvSpPr>
+          <p:cNvPr id="23" name="Rectangle 22">
+            <a:extLst>
+              <a:ext uri="{FF2B5EF4-FFF2-40B4-BE49-F238E27FC236}">
+                <a16:creationId xmlns:a16="http://schemas.microsoft.com/office/drawing/2014/main" id="{D6D61A61-40ED-4E47-A055-6AE291C96A2B}"/>
+              </a:ext>
+            </a:extLst>
+          </p:cNvPr>
+          <p:cNvSpPr/>
+          <p:nvPr/>
+        </p:nvSpPr>
+        <p:spPr>
+          <a:xfrm>
+            <a:off x="3386855" y="357727"/>
+            <a:ext cx="5380383" cy="468923"/>
+          </a:xfrm>
+          <a:prstGeom prst="rect">
+            <a:avLst/>
+          </a:prstGeom>
+          <a:solidFill>
+            <a:schemeClr val="bg1"/>
+          </a:solidFill>
+          <a:ln w="15875">
+            <a:noFill/>
+          </a:ln>
+        </p:spPr>
+        <p:style>
+          <a:lnRef idx="2">
+            <a:schemeClr val="accent1">
+              <a:shade val="50000"/>
+            </a:schemeClr>
+          </a:lnRef>
+          <a:fillRef idx="1">
+            <a:schemeClr val="accent1"/>
+          </a:fillRef>
+          <a:effectRef idx="0">
+            <a:schemeClr val="accent1"/>
+          </a:effectRef>
+          <a:fontRef idx="minor">
+            <a:schemeClr val="lt1"/>
+          </a:fontRef>
+        </p:style>
+        <p:txBody>
+          <a:bodyPr rtlCol="0" anchor="ctr"/>
+          <a:lstStyle/>
+          <a:p>
+            <a:r>
+              <a:rPr lang="en-US" dirty="0">
+                <a:solidFill>
+                  <a:schemeClr val="tx1"/>
+                </a:solidFill>
+              </a:rPr>
+              <a:t>Use reachability heuristic to prune at third-last layer.</a:t>
             </a:r>
           </a:p>
         </p:txBody>

</xml_diff>